<commit_message>
added IO handler info. Still need to update timing diagram
</commit_message>
<xml_diff>
--- a/docs/urcad/poster.pptx
+++ b/docs/urcad/poster.pptx
@@ -159,6 +159,10 @@
 </p:presentation>
 </file>
 
+<file path=ppt/revisionInfo.xml><?xml version="1.0" encoding="utf-8"?>
+<p1510:revInfo xmlns:a="http://schemas.openxmlformats.org/drawingml/2006/main" xmlns:r="http://schemas.openxmlformats.org/officeDocument/2006/relationships" xmlns:p1510="http://schemas.microsoft.com/office/powerpoint/2015/10/main"/>
+</file>
+
 <file path=ppt/handoutMasters/handoutMaster1.xml><?xml version="1.0" encoding="utf-8"?>
 <p:handoutMaster xmlns:a="http://schemas.openxmlformats.org/drawingml/2006/main" xmlns:r="http://schemas.openxmlformats.org/officeDocument/2006/relationships" xmlns:p="http://schemas.openxmlformats.org/presentationml/2006/main">
   <p:cSld>
@@ -595,35 +599,35 @@
           <a:p>
             <a:pPr lvl="0"/>
             <a:r>
-              <a:rPr lang="en-US" noProof="0" smtClean="0"/>
+              <a:rPr lang="en-US" noProof="0"/>
               <a:t>Click to edit Master text styles</a:t>
             </a:r>
           </a:p>
           <a:p>
             <a:pPr lvl="1"/>
             <a:r>
-              <a:rPr lang="en-US" noProof="0" smtClean="0"/>
+              <a:rPr lang="en-US" noProof="0"/>
               <a:t>Second level</a:t>
             </a:r>
           </a:p>
           <a:p>
             <a:pPr lvl="2"/>
             <a:r>
-              <a:rPr lang="en-US" noProof="0" smtClean="0"/>
+              <a:rPr lang="en-US" noProof="0"/>
               <a:t>Third level</a:t>
             </a:r>
           </a:p>
           <a:p>
             <a:pPr lvl="3"/>
             <a:r>
-              <a:rPr lang="en-US" noProof="0" smtClean="0"/>
+              <a:rPr lang="en-US" noProof="0"/>
               <a:t>Fourth level</a:t>
             </a:r>
           </a:p>
           <a:p>
             <a:pPr lvl="4"/>
             <a:r>
-              <a:rPr lang="en-US" noProof="0" smtClean="0"/>
+              <a:rPr lang="en-US" noProof="0"/>
               <a:t>Fifth level</a:t>
             </a:r>
           </a:p>
@@ -1034,7 +1038,7 @@
               <a:pPr eaLnBrk="1" hangingPunct="1"/>
               <a:t>1</a:t>
             </a:fld>
-            <a:endParaRPr lang="en-US" sz="1200" smtClean="0">
+            <a:endParaRPr lang="en-US" sz="1200">
               <a:latin typeface="Arial" charset="0"/>
             </a:endParaRPr>
           </a:p>
@@ -1096,7 +1100,7 @@
           <a:lstStyle/>
           <a:p>
             <a:pPr eaLnBrk="1" hangingPunct="1"/>
-            <a:endParaRPr lang="en-US" smtClean="0"/>
+            <a:endParaRPr lang="en-US"/>
           </a:p>
         </p:txBody>
       </p:sp>
@@ -1191,10 +1195,9 @@
           </a:lstStyle>
           <a:p>
             <a:r>
-              <a:rPr lang="en-US" smtClean="0"/>
+              <a:rPr lang="en-US"/>
               <a:t>Click to edit Master subtitle style</a:t>
             </a:r>
-            <a:endParaRPr lang="en-US"/>
           </a:p>
         </p:txBody>
       </p:sp>
@@ -1320,13 +1323,6 @@
   <p:clrMapOvr>
     <a:masterClrMapping/>
   </p:clrMapOvr>
-  <p:timing>
-    <p:tnLst>
-      <p:par>
-        <p:cTn id="1" dur="indefinite" restart="never" nodeType="tmRoot"/>
-      </p:par>
-    </p:tnLst>
-  </p:timing>
 </p:sldLayout>
 </file>
 
@@ -1371,10 +1367,9 @@
           <a:lstStyle/>
           <a:p>
             <a:r>
-              <a:rPr lang="en-US" smtClean="0"/>
+              <a:rPr lang="en-US"/>
               <a:t>Click to edit Master title style</a:t>
             </a:r>
-            <a:endParaRPr lang="en-US"/>
           </a:p>
         </p:txBody>
       </p:sp>
@@ -1403,38 +1398,37 @@
           <a:p>
             <a:pPr lvl="0"/>
             <a:r>
-              <a:rPr lang="en-US" smtClean="0"/>
+              <a:rPr lang="en-US"/>
               <a:t>Click to edit Master text styles</a:t>
             </a:r>
           </a:p>
           <a:p>
             <a:pPr lvl="1"/>
             <a:r>
-              <a:rPr lang="en-US" smtClean="0"/>
+              <a:rPr lang="en-US"/>
               <a:t>Second level</a:t>
             </a:r>
           </a:p>
           <a:p>
             <a:pPr lvl="2"/>
             <a:r>
-              <a:rPr lang="en-US" smtClean="0"/>
+              <a:rPr lang="en-US"/>
               <a:t>Third level</a:t>
             </a:r>
           </a:p>
           <a:p>
             <a:pPr lvl="3"/>
             <a:r>
-              <a:rPr lang="en-US" smtClean="0"/>
+              <a:rPr lang="en-US"/>
               <a:t>Fourth level</a:t>
             </a:r>
           </a:p>
           <a:p>
             <a:pPr lvl="4"/>
             <a:r>
-              <a:rPr lang="en-US" smtClean="0"/>
+              <a:rPr lang="en-US"/>
               <a:t>Fifth level</a:t>
             </a:r>
-            <a:endParaRPr lang="en-US"/>
           </a:p>
         </p:txBody>
       </p:sp>
@@ -1604,10 +1598,9 @@
           <a:lstStyle/>
           <a:p>
             <a:r>
-              <a:rPr lang="en-US" smtClean="0"/>
+              <a:rPr lang="en-US"/>
               <a:t>Click to edit Master title style</a:t>
             </a:r>
-            <a:endParaRPr lang="en-US"/>
           </a:p>
         </p:txBody>
       </p:sp>
@@ -1636,38 +1629,37 @@
           <a:p>
             <a:pPr lvl="0"/>
             <a:r>
-              <a:rPr lang="en-US" smtClean="0"/>
+              <a:rPr lang="en-US"/>
               <a:t>Click to edit Master text styles</a:t>
             </a:r>
           </a:p>
           <a:p>
             <a:pPr lvl="1"/>
             <a:r>
-              <a:rPr lang="en-US" smtClean="0"/>
+              <a:rPr lang="en-US"/>
               <a:t>Second level</a:t>
             </a:r>
           </a:p>
           <a:p>
             <a:pPr lvl="2"/>
             <a:r>
-              <a:rPr lang="en-US" smtClean="0"/>
+              <a:rPr lang="en-US"/>
               <a:t>Third level</a:t>
             </a:r>
           </a:p>
           <a:p>
             <a:pPr lvl="3"/>
             <a:r>
-              <a:rPr lang="en-US" smtClean="0"/>
+              <a:rPr lang="en-US"/>
               <a:t>Fourth level</a:t>
             </a:r>
           </a:p>
           <a:p>
             <a:pPr lvl="4"/>
             <a:r>
-              <a:rPr lang="en-US" smtClean="0"/>
+              <a:rPr lang="en-US"/>
               <a:t>Fifth level</a:t>
             </a:r>
-            <a:endParaRPr lang="en-US"/>
           </a:p>
         </p:txBody>
       </p:sp>
@@ -1793,13 +1785,6 @@
   <p:clrMapOvr>
     <a:masterClrMapping/>
   </p:clrMapOvr>
-  <p:timing>
-    <p:tnLst>
-      <p:par>
-        <p:cTn id="1" dur="indefinite" restart="never" nodeType="tmRoot"/>
-      </p:par>
-    </p:tnLst>
-  </p:timing>
 </p:sldLayout>
 </file>
 
@@ -1844,10 +1829,9 @@
           <a:lstStyle/>
           <a:p>
             <a:r>
-              <a:rPr lang="en-US" smtClean="0"/>
+              <a:rPr lang="en-US"/>
               <a:t>Click to edit Master title style</a:t>
             </a:r>
-            <a:endParaRPr lang="en-US"/>
           </a:p>
         </p:txBody>
       </p:sp>
@@ -1973,13 +1957,6 @@
   <p:clrMapOvr>
     <a:masterClrMapping/>
   </p:clrMapOvr>
-  <p:timing>
-    <p:tnLst>
-      <p:par>
-        <p:cTn id="1" dur="indefinite" restart="never" nodeType="tmRoot"/>
-      </p:par>
-    </p:tnLst>
-  </p:timing>
 </p:sldLayout>
 </file>
 
@@ -2028,10 +2005,9 @@
           </a:lstStyle>
           <a:p>
             <a:r>
-              <a:rPr lang="en-US" smtClean="0"/>
+              <a:rPr lang="en-US"/>
               <a:t>Click to edit Master title style</a:t>
             </a:r>
-            <a:endParaRPr lang="en-US"/>
           </a:p>
         </p:txBody>
       </p:sp>
@@ -2097,7 +2073,7 @@
           <a:p>
             <a:pPr lvl="0"/>
             <a:r>
-              <a:rPr lang="en-US" smtClean="0"/>
+              <a:rPr lang="en-US"/>
               <a:t>Click to edit Master text styles</a:t>
             </a:r>
           </a:p>
@@ -2225,13 +2201,6 @@
   <p:clrMapOvr>
     <a:masterClrMapping/>
   </p:clrMapOvr>
-  <p:timing>
-    <p:tnLst>
-      <p:par>
-        <p:cTn id="1" dur="indefinite" restart="never" nodeType="tmRoot"/>
-      </p:par>
-    </p:tnLst>
-  </p:timing>
 </p:sldLayout>
 </file>
 
@@ -2276,10 +2245,9 @@
           <a:lstStyle/>
           <a:p>
             <a:r>
-              <a:rPr lang="en-US" smtClean="0"/>
+              <a:rPr lang="en-US"/>
               <a:t>Click to edit Master title style</a:t>
             </a:r>
-            <a:endParaRPr lang="en-US"/>
           </a:p>
         </p:txBody>
       </p:sp>
@@ -2336,38 +2304,37 @@
           <a:p>
             <a:pPr lvl="0"/>
             <a:r>
-              <a:rPr lang="en-US" smtClean="0"/>
+              <a:rPr lang="en-US"/>
               <a:t>Click to edit Master text styles</a:t>
             </a:r>
           </a:p>
           <a:p>
             <a:pPr lvl="1"/>
             <a:r>
-              <a:rPr lang="en-US" smtClean="0"/>
+              <a:rPr lang="en-US"/>
               <a:t>Second level</a:t>
             </a:r>
           </a:p>
           <a:p>
             <a:pPr lvl="2"/>
             <a:r>
-              <a:rPr lang="en-US" smtClean="0"/>
+              <a:rPr lang="en-US"/>
               <a:t>Third level</a:t>
             </a:r>
           </a:p>
           <a:p>
             <a:pPr lvl="3"/>
             <a:r>
-              <a:rPr lang="en-US" smtClean="0"/>
+              <a:rPr lang="en-US"/>
               <a:t>Fourth level</a:t>
             </a:r>
           </a:p>
           <a:p>
             <a:pPr lvl="4"/>
             <a:r>
-              <a:rPr lang="en-US" smtClean="0"/>
+              <a:rPr lang="en-US"/>
               <a:t>Fifth level</a:t>
             </a:r>
-            <a:endParaRPr lang="en-US"/>
           </a:p>
         </p:txBody>
       </p:sp>
@@ -2424,38 +2391,37 @@
           <a:p>
             <a:pPr lvl="0"/>
             <a:r>
-              <a:rPr lang="en-US" smtClean="0"/>
+              <a:rPr lang="en-US"/>
               <a:t>Click to edit Master text styles</a:t>
             </a:r>
           </a:p>
           <a:p>
             <a:pPr lvl="1"/>
             <a:r>
-              <a:rPr lang="en-US" smtClean="0"/>
+              <a:rPr lang="en-US"/>
               <a:t>Second level</a:t>
             </a:r>
           </a:p>
           <a:p>
             <a:pPr lvl="2"/>
             <a:r>
-              <a:rPr lang="en-US" smtClean="0"/>
+              <a:rPr lang="en-US"/>
               <a:t>Third level</a:t>
             </a:r>
           </a:p>
           <a:p>
             <a:pPr lvl="3"/>
             <a:r>
-              <a:rPr lang="en-US" smtClean="0"/>
+              <a:rPr lang="en-US"/>
               <a:t>Fourth level</a:t>
             </a:r>
           </a:p>
           <a:p>
             <a:pPr lvl="4"/>
             <a:r>
-              <a:rPr lang="en-US" smtClean="0"/>
+              <a:rPr lang="en-US"/>
               <a:t>Fifth level</a:t>
             </a:r>
-            <a:endParaRPr lang="en-US"/>
           </a:p>
         </p:txBody>
       </p:sp>
@@ -2629,10 +2595,9 @@
           </a:lstStyle>
           <a:p>
             <a:r>
-              <a:rPr lang="en-US" smtClean="0"/>
+              <a:rPr lang="en-US"/>
               <a:t>Click to edit Master title style</a:t>
             </a:r>
-            <a:endParaRPr lang="en-US"/>
           </a:p>
         </p:txBody>
       </p:sp>
@@ -2698,7 +2663,7 @@
           <a:p>
             <a:pPr lvl="0"/>
             <a:r>
-              <a:rPr lang="en-US" smtClean="0"/>
+              <a:rPr lang="en-US"/>
               <a:t>Click to edit Master text styles</a:t>
             </a:r>
           </a:p>
@@ -2757,38 +2722,37 @@
           <a:p>
             <a:pPr lvl="0"/>
             <a:r>
-              <a:rPr lang="en-US" smtClean="0"/>
+              <a:rPr lang="en-US"/>
               <a:t>Click to edit Master text styles</a:t>
             </a:r>
           </a:p>
           <a:p>
             <a:pPr lvl="1"/>
             <a:r>
-              <a:rPr lang="en-US" smtClean="0"/>
+              <a:rPr lang="en-US"/>
               <a:t>Second level</a:t>
             </a:r>
           </a:p>
           <a:p>
             <a:pPr lvl="2"/>
             <a:r>
-              <a:rPr lang="en-US" smtClean="0"/>
+              <a:rPr lang="en-US"/>
               <a:t>Third level</a:t>
             </a:r>
           </a:p>
           <a:p>
             <a:pPr lvl="3"/>
             <a:r>
-              <a:rPr lang="en-US" smtClean="0"/>
+              <a:rPr lang="en-US"/>
               <a:t>Fourth level</a:t>
             </a:r>
           </a:p>
           <a:p>
             <a:pPr lvl="4"/>
             <a:r>
-              <a:rPr lang="en-US" smtClean="0"/>
+              <a:rPr lang="en-US"/>
               <a:t>Fifth level</a:t>
             </a:r>
-            <a:endParaRPr lang="en-US"/>
           </a:p>
         </p:txBody>
       </p:sp>
@@ -2854,7 +2818,7 @@
           <a:p>
             <a:pPr lvl="0"/>
             <a:r>
-              <a:rPr lang="en-US" smtClean="0"/>
+              <a:rPr lang="en-US"/>
               <a:t>Click to edit Master text styles</a:t>
             </a:r>
           </a:p>
@@ -2913,38 +2877,37 @@
           <a:p>
             <a:pPr lvl="0"/>
             <a:r>
-              <a:rPr lang="en-US" smtClean="0"/>
+              <a:rPr lang="en-US"/>
               <a:t>Click to edit Master text styles</a:t>
             </a:r>
           </a:p>
           <a:p>
             <a:pPr lvl="1"/>
             <a:r>
-              <a:rPr lang="en-US" smtClean="0"/>
+              <a:rPr lang="en-US"/>
               <a:t>Second level</a:t>
             </a:r>
           </a:p>
           <a:p>
             <a:pPr lvl="2"/>
             <a:r>
-              <a:rPr lang="en-US" smtClean="0"/>
+              <a:rPr lang="en-US"/>
               <a:t>Third level</a:t>
             </a:r>
           </a:p>
           <a:p>
             <a:pPr lvl="3"/>
             <a:r>
-              <a:rPr lang="en-US" smtClean="0"/>
+              <a:rPr lang="en-US"/>
               <a:t>Fourth level</a:t>
             </a:r>
           </a:p>
           <a:p>
             <a:pPr lvl="4"/>
             <a:r>
-              <a:rPr lang="en-US" smtClean="0"/>
+              <a:rPr lang="en-US"/>
               <a:t>Fifth level</a:t>
             </a:r>
-            <a:endParaRPr lang="en-US"/>
           </a:p>
         </p:txBody>
       </p:sp>
@@ -3114,10 +3077,9 @@
           <a:lstStyle/>
           <a:p>
             <a:r>
-              <a:rPr lang="en-US" smtClean="0"/>
+              <a:rPr lang="en-US"/>
               <a:t>Click to edit Master title style</a:t>
             </a:r>
-            <a:endParaRPr lang="en-US"/>
           </a:p>
         </p:txBody>
       </p:sp>
@@ -3433,10 +3395,9 @@
           </a:lstStyle>
           <a:p>
             <a:r>
-              <a:rPr lang="en-US" smtClean="0"/>
+              <a:rPr lang="en-US"/>
               <a:t>Click to edit Master title style</a:t>
             </a:r>
-            <a:endParaRPr lang="en-US"/>
           </a:p>
         </p:txBody>
       </p:sp>
@@ -3493,38 +3454,37 @@
           <a:p>
             <a:pPr lvl="0"/>
             <a:r>
-              <a:rPr lang="en-US" smtClean="0"/>
+              <a:rPr lang="en-US"/>
               <a:t>Click to edit Master text styles</a:t>
             </a:r>
           </a:p>
           <a:p>
             <a:pPr lvl="1"/>
             <a:r>
-              <a:rPr lang="en-US" smtClean="0"/>
+              <a:rPr lang="en-US"/>
               <a:t>Second level</a:t>
             </a:r>
           </a:p>
           <a:p>
             <a:pPr lvl="2"/>
             <a:r>
-              <a:rPr lang="en-US" smtClean="0"/>
+              <a:rPr lang="en-US"/>
               <a:t>Third level</a:t>
             </a:r>
           </a:p>
           <a:p>
             <a:pPr lvl="3"/>
             <a:r>
-              <a:rPr lang="en-US" smtClean="0"/>
+              <a:rPr lang="en-US"/>
               <a:t>Fourth level</a:t>
             </a:r>
           </a:p>
           <a:p>
             <a:pPr lvl="4"/>
             <a:r>
-              <a:rPr lang="en-US" smtClean="0"/>
+              <a:rPr lang="en-US"/>
               <a:t>Fifth level</a:t>
             </a:r>
-            <a:endParaRPr lang="en-US"/>
           </a:p>
         </p:txBody>
       </p:sp>
@@ -3590,7 +3550,7 @@
           <a:p>
             <a:pPr lvl="0"/>
             <a:r>
-              <a:rPr lang="en-US" smtClean="0"/>
+              <a:rPr lang="en-US"/>
               <a:t>Click to edit Master text styles</a:t>
             </a:r>
           </a:p>
@@ -3766,10 +3726,9 @@
           </a:lstStyle>
           <a:p>
             <a:r>
-              <a:rPr lang="en-US" smtClean="0"/>
+              <a:rPr lang="en-US"/>
               <a:t>Click to edit Master title style</a:t>
             </a:r>
-            <a:endParaRPr lang="en-US"/>
           </a:p>
         </p:txBody>
       </p:sp>
@@ -3834,7 +3793,7 @@
           </a:lstStyle>
           <a:p>
             <a:pPr lvl="0"/>
-            <a:endParaRPr lang="en-US" noProof="0" smtClean="0"/>
+            <a:endParaRPr lang="en-US" noProof="0"/>
           </a:p>
         </p:txBody>
       </p:sp>
@@ -3900,7 +3859,7 @@
           <a:p>
             <a:pPr lvl="0"/>
             <a:r>
-              <a:rPr lang="en-US" smtClean="0"/>
+              <a:rPr lang="en-US"/>
               <a:t>Click to edit Master text styles</a:t>
             </a:r>
           </a:p>
@@ -4028,13 +3987,6 @@
   <p:clrMapOvr>
     <a:masterClrMapping/>
   </p:clrMapOvr>
-  <p:timing>
-    <p:tnLst>
-      <p:par>
-        <p:cTn id="1" dur="indefinite" restart="never" nodeType="tmRoot"/>
-      </p:par>
-    </p:tnLst>
-  </p:timing>
 </p:sldLayout>
 </file>
 
@@ -4113,7 +4065,7 @@
               <a:buNone/>
               <a:tabLst/>
             </a:pPr>
-            <a:endParaRPr kumimoji="0" lang="en-US" sz="7500" b="0" i="0" u="none" strike="noStrike" cap="none" normalizeH="0" baseline="0" smtClean="0">
+            <a:endParaRPr kumimoji="0" lang="en-US" sz="7500" b="0" i="0" u="none" strike="noStrike" cap="none" normalizeH="0" baseline="0">
               <a:ln>
                 <a:noFill/>
               </a:ln>
@@ -4176,7 +4128,7 @@
               <a:buNone/>
               <a:tabLst/>
             </a:pPr>
-            <a:endParaRPr kumimoji="0" lang="en-US" sz="7500" b="0" i="0" u="none" strike="noStrike" cap="none" normalizeH="0" baseline="0" smtClean="0">
+            <a:endParaRPr kumimoji="0" lang="en-US" sz="7500" b="0" i="0" u="none" strike="noStrike" cap="none" normalizeH="0" baseline="0">
               <a:ln>
                 <a:noFill/>
               </a:ln>
@@ -4248,7 +4200,7 @@
               <a:buNone/>
               <a:tabLst/>
             </a:pPr>
-            <a:endParaRPr kumimoji="0" lang="en-US" sz="7500" b="0" i="0" u="none" strike="noStrike" cap="none" normalizeH="0" baseline="0" dirty="0" smtClean="0">
+            <a:endParaRPr kumimoji="0" lang="en-US" sz="7500" b="0" i="0" u="none" strike="noStrike" cap="none" normalizeH="0" baseline="0" dirty="0">
               <a:ln>
                 <a:noFill/>
               </a:ln>
@@ -4948,7 +4900,7 @@
               <a:buNone/>
               <a:tabLst/>
             </a:pPr>
-            <a:endParaRPr kumimoji="0" lang="en-US" sz="7500" b="0" i="0" u="none" strike="noStrike" cap="none" normalizeH="0" baseline="0" smtClean="0">
+            <a:endParaRPr kumimoji="0" lang="en-US" sz="7500" b="0" i="0" u="none" strike="noStrike" cap="none" normalizeH="0" baseline="0">
               <a:ln>
                 <a:noFill/>
               </a:ln>
@@ -5013,7 +4965,7 @@
               <a:buNone/>
               <a:tabLst/>
             </a:pPr>
-            <a:endParaRPr kumimoji="0" lang="en-US" sz="7500" b="0" i="0" u="none" strike="noStrike" cap="none" normalizeH="0" baseline="0" smtClean="0">
+            <a:endParaRPr kumimoji="0" lang="en-US" sz="7500" b="0" i="0" u="none" strike="noStrike" cap="none" normalizeH="0" baseline="0">
               <a:ln>
                 <a:noFill/>
               </a:ln>
@@ -5076,7 +5028,7 @@
               <a:buNone/>
               <a:tabLst/>
             </a:pPr>
-            <a:endParaRPr kumimoji="0" lang="en-US" sz="7500" b="0" i="0" u="none" strike="noStrike" cap="none" normalizeH="0" baseline="0" smtClean="0">
+            <a:endParaRPr kumimoji="0" lang="en-US" sz="7500" b="0" i="0" u="none" strike="noStrike" cap="none" normalizeH="0" baseline="0">
               <a:ln>
                 <a:noFill/>
               </a:ln>
@@ -5139,7 +5091,7 @@
               <a:buNone/>
               <a:tabLst/>
             </a:pPr>
-            <a:endParaRPr kumimoji="0" lang="en-US" sz="7500" b="0" i="0" u="none" strike="noStrike" cap="none" normalizeH="0" baseline="0" smtClean="0">
+            <a:endParaRPr kumimoji="0" lang="en-US" sz="7500" b="0" i="0" u="none" strike="noStrike" cap="none" normalizeH="0" baseline="0">
               <a:ln>
                 <a:noFill/>
               </a:ln>
@@ -5168,13 +5120,6 @@
     <p:sldLayoutId id="2147483658" r:id="rId10"/>
     <p:sldLayoutId id="2147483659" r:id="rId11"/>
   </p:sldLayoutIdLst>
-  <p:timing>
-    <p:tnLst>
-      <p:par>
-        <p:cTn id="1" dur="indefinite" restart="never" nodeType="tmRoot"/>
-      </p:par>
-    </p:tnLst>
-  </p:timing>
   <p:txStyles>
     <p:titleStyle>
       <a:lvl1pPr algn="ctr" defTabSz="2819400" rtl="0" eaLnBrk="0" fontAlgn="base" hangingPunct="0">
@@ -5619,7 +5564,7 @@
               <a:buNone/>
               <a:tabLst/>
             </a:pPr>
-            <a:endParaRPr kumimoji="0" lang="en-US" sz="7500" b="0" i="0" u="none" strike="noStrike" cap="none" normalizeH="0" baseline="0" smtClean="0">
+            <a:endParaRPr kumimoji="0" lang="en-US" sz="7500" b="0" i="0" u="none" strike="noStrike" cap="none" normalizeH="0" baseline="0">
               <a:ln>
                 <a:noFill/>
               </a:ln>
@@ -6051,15 +5996,7 @@
                   <a:schemeClr val="bg1"/>
                 </a:solidFill>
               </a:rPr>
-              <a:t>What are Galois Fields</a:t>
-            </a:r>
-            <a:r>
-              <a:rPr lang="en-US" sz="3200" b="1" dirty="0" smtClean="0">
-                <a:solidFill>
-                  <a:schemeClr val="bg1"/>
-                </a:solidFill>
-              </a:rPr>
-              <a:t>?</a:t>
+              <a:t>What are Galois Fields?</a:t>
             </a:r>
             <a:endParaRPr lang="en-US" sz="1000" b="1" dirty="0">
               <a:solidFill>
@@ -6070,352 +6007,28 @@
           </a:p>
           <a:p>
             <a:pPr algn="ctr"/>
-            <a:endParaRPr lang="en-US" sz="2800" dirty="0" smtClean="0"/>
+            <a:endParaRPr lang="en-US" sz="2800" dirty="0"/>
           </a:p>
           <a:p>
             <a:pPr algn="just"/>
             <a:r>
-              <a:rPr lang="en-US" sz="2800" dirty="0" smtClean="0"/>
+              <a:rPr lang="en-US" sz="2800" dirty="0"/>
               <a:t>A field with a finite number of elements, Galois fields are a key part of number theory, abstract algebra, arithmetic algebraic geometry, and cryptography. In error detection and correction, Galois fields are utilized in cyclic redundancy check (CRC) which are used in digital networks and storage devices to detect accidental changes to raw data.</a:t>
             </a:r>
           </a:p>
           <a:p>
             <a:pPr algn="just"/>
-            <a:endParaRPr lang="en-US" sz="2800" dirty="0" smtClean="0"/>
+            <a:endParaRPr lang="en-US" sz="2800" dirty="0"/>
           </a:p>
           <a:p>
             <a:pPr algn="ctr"/>
             <a:r>
-              <a:rPr lang="en-US" sz="2800" b="1" dirty="0" smtClean="0"/>
+              <a:rPr lang="en-US" sz="2800" b="1" dirty="0"/>
               <a:t>Table 1:</a:t>
             </a:r>
             <a:r>
-              <a:rPr lang="en-US" sz="2800" dirty="0" smtClean="0"/>
+              <a:rPr lang="en-US" sz="2800" dirty="0"/>
               <a:t> Elements of </a:t>
-            </a:r>
-            <a:r>
-              <a:rPr lang="en-US" sz="2800" dirty="0" smtClean="0">
-                <a:solidFill>
-                  <a:srgbClr val="000000"/>
-                </a:solidFill>
-                <a:latin typeface="Arial" panose="020B0604020202020204" pitchFamily="34" charset="0"/>
-              </a:rPr>
-              <a:t>x</a:t>
-            </a:r>
-            <a:r>
-              <a:rPr lang="en-US" sz="2800" baseline="30000" dirty="0" smtClean="0">
-                <a:solidFill>
-                  <a:srgbClr val="000000"/>
-                </a:solidFill>
-                <a:latin typeface="Arial" panose="020B0604020202020204" pitchFamily="34" charset="0"/>
-              </a:rPr>
-              <a:t>3</a:t>
-            </a:r>
-            <a:r>
-              <a:rPr lang="en-US" sz="2800" dirty="0" smtClean="0">
-                <a:solidFill>
-                  <a:srgbClr val="000000"/>
-                </a:solidFill>
-                <a:latin typeface="Arial" panose="020B0604020202020204" pitchFamily="34" charset="0"/>
-              </a:rPr>
-              <a:t> </a:t>
-            </a:r>
-            <a:r>
-              <a:rPr lang="en-US" sz="2800" dirty="0">
-                <a:solidFill>
-                  <a:srgbClr val="000000"/>
-                </a:solidFill>
-                <a:latin typeface="Arial" panose="020B0604020202020204" pitchFamily="34" charset="0"/>
-              </a:rPr>
-              <a:t>+ </a:t>
-            </a:r>
-            <a:r>
-              <a:rPr lang="en-US" sz="2800" dirty="0" smtClean="0">
-                <a:solidFill>
-                  <a:srgbClr val="000000"/>
-                </a:solidFill>
-                <a:latin typeface="Arial" panose="020B0604020202020204" pitchFamily="34" charset="0"/>
-              </a:rPr>
-              <a:t>x</a:t>
-            </a:r>
-            <a:r>
-              <a:rPr lang="en-US" sz="2800" baseline="30000" dirty="0" smtClean="0">
-                <a:solidFill>
-                  <a:srgbClr val="000000"/>
-                </a:solidFill>
-                <a:latin typeface="Arial" panose="020B0604020202020204" pitchFamily="34" charset="0"/>
-              </a:rPr>
-              <a:t>2</a:t>
-            </a:r>
-            <a:r>
-              <a:rPr lang="en-US" sz="2800" dirty="0" smtClean="0">
-                <a:solidFill>
-                  <a:srgbClr val="000000"/>
-                </a:solidFill>
-                <a:latin typeface="Arial" panose="020B0604020202020204" pitchFamily="34" charset="0"/>
-              </a:rPr>
-              <a:t> </a:t>
-            </a:r>
-            <a:r>
-              <a:rPr lang="en-US" sz="2800" dirty="0">
-                <a:solidFill>
-                  <a:srgbClr val="000000"/>
-                </a:solidFill>
-                <a:latin typeface="Arial" panose="020B0604020202020204" pitchFamily="34" charset="0"/>
-              </a:rPr>
-              <a:t>+ </a:t>
-            </a:r>
-            <a:r>
-              <a:rPr lang="en-US" sz="2800" dirty="0" smtClean="0">
-                <a:solidFill>
-                  <a:srgbClr val="000000"/>
-                </a:solidFill>
-                <a:latin typeface="Arial" panose="020B0604020202020204" pitchFamily="34" charset="0"/>
-              </a:rPr>
-              <a:t>x</a:t>
-            </a:r>
-            <a:r>
-              <a:rPr lang="en-US" sz="2800" baseline="30000" dirty="0" smtClean="0">
-                <a:solidFill>
-                  <a:srgbClr val="000000"/>
-                </a:solidFill>
-                <a:latin typeface="Arial" panose="020B0604020202020204" pitchFamily="34" charset="0"/>
-              </a:rPr>
-              <a:t>0</a:t>
-            </a:r>
-          </a:p>
-          <a:p>
-            <a:pPr algn="ctr"/>
-            <a:endParaRPr lang="en-US" sz="2800" baseline="30000" dirty="0" smtClean="0">
-              <a:solidFill>
-                <a:srgbClr val="000000"/>
-              </a:solidFill>
-              <a:latin typeface="Arial" panose="020B0604020202020204" pitchFamily="34" charset="0"/>
-            </a:endParaRPr>
-          </a:p>
-          <a:p>
-            <a:pPr algn="just"/>
-            <a:endParaRPr lang="en-US" sz="2800" baseline="30000" dirty="0">
-              <a:solidFill>
-                <a:srgbClr val="000000"/>
-              </a:solidFill>
-              <a:latin typeface="Arial" panose="020B0604020202020204" pitchFamily="34" charset="0"/>
-            </a:endParaRPr>
-          </a:p>
-          <a:p>
-            <a:pPr algn="just"/>
-            <a:endParaRPr lang="en-US" sz="2800" baseline="30000" dirty="0" smtClean="0">
-              <a:solidFill>
-                <a:srgbClr val="000000"/>
-              </a:solidFill>
-              <a:latin typeface="Arial" panose="020B0604020202020204" pitchFamily="34" charset="0"/>
-            </a:endParaRPr>
-          </a:p>
-          <a:p>
-            <a:pPr algn="just"/>
-            <a:endParaRPr lang="en-US" sz="2800" baseline="30000" dirty="0">
-              <a:solidFill>
-                <a:srgbClr val="000000"/>
-              </a:solidFill>
-              <a:latin typeface="Arial" panose="020B0604020202020204" pitchFamily="34" charset="0"/>
-            </a:endParaRPr>
-          </a:p>
-          <a:p>
-            <a:pPr algn="just"/>
-            <a:endParaRPr lang="en-US" sz="2800" baseline="30000" dirty="0" smtClean="0">
-              <a:solidFill>
-                <a:srgbClr val="000000"/>
-              </a:solidFill>
-              <a:latin typeface="Arial" panose="020B0604020202020204" pitchFamily="34" charset="0"/>
-            </a:endParaRPr>
-          </a:p>
-          <a:p>
-            <a:pPr algn="just"/>
-            <a:endParaRPr lang="en-US" sz="2800" baseline="30000" dirty="0">
-              <a:solidFill>
-                <a:srgbClr val="000000"/>
-              </a:solidFill>
-              <a:latin typeface="Arial" panose="020B0604020202020204" pitchFamily="34" charset="0"/>
-            </a:endParaRPr>
-          </a:p>
-          <a:p>
-            <a:pPr algn="just"/>
-            <a:endParaRPr lang="en-US" sz="2800" baseline="30000" dirty="0" smtClean="0">
-              <a:solidFill>
-                <a:srgbClr val="000000"/>
-              </a:solidFill>
-              <a:latin typeface="Arial" panose="020B0604020202020204" pitchFamily="34" charset="0"/>
-            </a:endParaRPr>
-          </a:p>
-          <a:p>
-            <a:pPr algn="just"/>
-            <a:endParaRPr lang="en-US" sz="2800" baseline="30000" dirty="0">
-              <a:solidFill>
-                <a:srgbClr val="000000"/>
-              </a:solidFill>
-              <a:latin typeface="Arial" panose="020B0604020202020204" pitchFamily="34" charset="0"/>
-            </a:endParaRPr>
-          </a:p>
-          <a:p>
-            <a:pPr algn="just"/>
-            <a:endParaRPr lang="en-US" sz="2800" baseline="30000" dirty="0" smtClean="0">
-              <a:solidFill>
-                <a:srgbClr val="000000"/>
-              </a:solidFill>
-              <a:latin typeface="Arial" panose="020B0604020202020204" pitchFamily="34" charset="0"/>
-            </a:endParaRPr>
-          </a:p>
-          <a:p>
-            <a:pPr algn="just"/>
-            <a:endParaRPr lang="en-US" sz="2800" baseline="30000" dirty="0">
-              <a:solidFill>
-                <a:srgbClr val="000000"/>
-              </a:solidFill>
-              <a:latin typeface="Arial" panose="020B0604020202020204" pitchFamily="34" charset="0"/>
-            </a:endParaRPr>
-          </a:p>
-          <a:p>
-            <a:pPr algn="just"/>
-            <a:endParaRPr lang="en-US" sz="2800" baseline="30000" dirty="0" smtClean="0">
-              <a:solidFill>
-                <a:srgbClr val="000000"/>
-              </a:solidFill>
-              <a:latin typeface="Arial" panose="020B0604020202020204" pitchFamily="34" charset="0"/>
-            </a:endParaRPr>
-          </a:p>
-          <a:p>
-            <a:pPr algn="just"/>
-            <a:endParaRPr lang="en-US" sz="2800" baseline="30000" dirty="0">
-              <a:solidFill>
-                <a:srgbClr val="000000"/>
-              </a:solidFill>
-              <a:latin typeface="Arial" panose="020B0604020202020204" pitchFamily="34" charset="0"/>
-            </a:endParaRPr>
-          </a:p>
-          <a:p>
-            <a:pPr algn="just"/>
-            <a:endParaRPr lang="en-US" sz="2800" baseline="30000" dirty="0" smtClean="0">
-              <a:solidFill>
-                <a:srgbClr val="000000"/>
-              </a:solidFill>
-              <a:latin typeface="Arial" panose="020B0604020202020204" pitchFamily="34" charset="0"/>
-            </a:endParaRPr>
-          </a:p>
-          <a:p>
-            <a:pPr algn="just"/>
-            <a:endParaRPr lang="en-US" sz="2800" baseline="30000" dirty="0">
-              <a:solidFill>
-                <a:srgbClr val="000000"/>
-              </a:solidFill>
-              <a:latin typeface="Arial" panose="020B0604020202020204" pitchFamily="34" charset="0"/>
-            </a:endParaRPr>
-          </a:p>
-          <a:p>
-            <a:pPr algn="just"/>
-            <a:endParaRPr lang="en-US" sz="2800" baseline="30000" dirty="0" smtClean="0">
-              <a:solidFill>
-                <a:srgbClr val="000000"/>
-              </a:solidFill>
-              <a:latin typeface="Arial" panose="020B0604020202020204" pitchFamily="34" charset="0"/>
-            </a:endParaRPr>
-          </a:p>
-          <a:p>
-            <a:pPr algn="just"/>
-            <a:endParaRPr lang="en-US" sz="2800" baseline="30000" dirty="0">
-              <a:solidFill>
-                <a:srgbClr val="000000"/>
-              </a:solidFill>
-              <a:latin typeface="Arial" panose="020B0604020202020204" pitchFamily="34" charset="0"/>
-            </a:endParaRPr>
-          </a:p>
-          <a:p>
-            <a:pPr algn="just"/>
-            <a:endParaRPr lang="en-US" sz="2800" baseline="30000" dirty="0" smtClean="0">
-              <a:solidFill>
-                <a:srgbClr val="000000"/>
-              </a:solidFill>
-              <a:latin typeface="Arial" panose="020B0604020202020204" pitchFamily="34" charset="0"/>
-            </a:endParaRPr>
-          </a:p>
-          <a:p>
-            <a:pPr algn="just"/>
-            <a:endParaRPr lang="en-US" sz="2800" baseline="30000" dirty="0">
-              <a:solidFill>
-                <a:srgbClr val="000000"/>
-              </a:solidFill>
-              <a:latin typeface="Arial" panose="020B0604020202020204" pitchFamily="34" charset="0"/>
-            </a:endParaRPr>
-          </a:p>
-          <a:p>
-            <a:pPr algn="just"/>
-            <a:endParaRPr lang="en-US" sz="2800" baseline="30000" dirty="0" smtClean="0">
-              <a:solidFill>
-                <a:srgbClr val="000000"/>
-              </a:solidFill>
-              <a:latin typeface="Arial" panose="020B0604020202020204" pitchFamily="34" charset="0"/>
-            </a:endParaRPr>
-          </a:p>
-          <a:p>
-            <a:pPr algn="just"/>
-            <a:endParaRPr lang="en-US" sz="2800" baseline="30000" dirty="0">
-              <a:solidFill>
-                <a:srgbClr val="000000"/>
-              </a:solidFill>
-              <a:latin typeface="Arial" panose="020B0604020202020204" pitchFamily="34" charset="0"/>
-            </a:endParaRPr>
-          </a:p>
-          <a:p>
-            <a:pPr algn="just"/>
-            <a:endParaRPr lang="en-US" sz="2800" baseline="30000" dirty="0" smtClean="0">
-              <a:solidFill>
-                <a:srgbClr val="000000"/>
-              </a:solidFill>
-              <a:latin typeface="Arial" panose="020B0604020202020204" pitchFamily="34" charset="0"/>
-            </a:endParaRPr>
-          </a:p>
-          <a:p>
-            <a:pPr algn="just"/>
-            <a:endParaRPr lang="en-US" sz="2800" baseline="30000" dirty="0" smtClean="0">
-              <a:solidFill>
-                <a:srgbClr val="000000"/>
-              </a:solidFill>
-              <a:latin typeface="Arial" panose="020B0604020202020204" pitchFamily="34" charset="0"/>
-            </a:endParaRPr>
-          </a:p>
-          <a:p>
-            <a:pPr algn="just"/>
-            <a:endParaRPr lang="en-US" sz="2800" baseline="-25000" dirty="0" smtClean="0">
-              <a:solidFill>
-                <a:srgbClr val="000000"/>
-              </a:solidFill>
-              <a:latin typeface="Arial" panose="020B0604020202020204" pitchFamily="34" charset="0"/>
-            </a:endParaRPr>
-          </a:p>
-          <a:p>
-            <a:pPr algn="ctr"/>
-            <a:r>
-              <a:rPr lang="en-US" sz="2800" b="1" dirty="0" smtClean="0">
-                <a:solidFill>
-                  <a:srgbClr val="000000"/>
-                </a:solidFill>
-              </a:rPr>
-              <a:t>Figure 1:</a:t>
-            </a:r>
-            <a:r>
-              <a:rPr lang="en-US" sz="2800" dirty="0" smtClean="0">
-                <a:solidFill>
-                  <a:srgbClr val="000000"/>
-                </a:solidFill>
-              </a:rPr>
-              <a:t> Operations of </a:t>
-            </a:r>
-            <a:r>
-              <a:rPr lang="en-US" sz="2800" dirty="0" smtClean="0"/>
-              <a:t>elements </a:t>
-            </a:r>
-            <a:r>
-              <a:rPr lang="en-US" sz="2800" dirty="0"/>
-              <a:t>of </a:t>
             </a:r>
             <a:r>
               <a:rPr lang="en-US" sz="2800" dirty="0">
@@ -6460,10 +6073,249 @@
                 </a:solidFill>
                 <a:latin typeface="Arial" panose="020B0604020202020204" pitchFamily="34" charset="0"/>
               </a:rPr>
-              <a:t> + </a:t>
+              <a:t> + x</a:t>
             </a:r>
             <a:r>
-              <a:rPr lang="en-US" sz="2800" dirty="0" smtClean="0">
+              <a:rPr lang="en-US" sz="2800" baseline="30000" dirty="0">
+                <a:solidFill>
+                  <a:srgbClr val="000000"/>
+                </a:solidFill>
+                <a:latin typeface="Arial" panose="020B0604020202020204" pitchFamily="34" charset="0"/>
+              </a:rPr>
+              <a:t>0</a:t>
+            </a:r>
+          </a:p>
+          <a:p>
+            <a:pPr algn="ctr"/>
+            <a:endParaRPr lang="en-US" sz="2800" baseline="30000" dirty="0">
+              <a:solidFill>
+                <a:srgbClr val="000000"/>
+              </a:solidFill>
+              <a:latin typeface="Arial" panose="020B0604020202020204" pitchFamily="34" charset="0"/>
+            </a:endParaRPr>
+          </a:p>
+          <a:p>
+            <a:pPr algn="just"/>
+            <a:endParaRPr lang="en-US" sz="2800" baseline="30000" dirty="0">
+              <a:solidFill>
+                <a:srgbClr val="000000"/>
+              </a:solidFill>
+              <a:latin typeface="Arial" panose="020B0604020202020204" pitchFamily="34" charset="0"/>
+            </a:endParaRPr>
+          </a:p>
+          <a:p>
+            <a:pPr algn="just"/>
+            <a:endParaRPr lang="en-US" sz="2800" baseline="30000" dirty="0">
+              <a:solidFill>
+                <a:srgbClr val="000000"/>
+              </a:solidFill>
+              <a:latin typeface="Arial" panose="020B0604020202020204" pitchFamily="34" charset="0"/>
+            </a:endParaRPr>
+          </a:p>
+          <a:p>
+            <a:pPr algn="just"/>
+            <a:endParaRPr lang="en-US" sz="2800" baseline="30000" dirty="0">
+              <a:solidFill>
+                <a:srgbClr val="000000"/>
+              </a:solidFill>
+              <a:latin typeface="Arial" panose="020B0604020202020204" pitchFamily="34" charset="0"/>
+            </a:endParaRPr>
+          </a:p>
+          <a:p>
+            <a:pPr algn="just"/>
+            <a:endParaRPr lang="en-US" sz="2800" baseline="30000" dirty="0">
+              <a:solidFill>
+                <a:srgbClr val="000000"/>
+              </a:solidFill>
+              <a:latin typeface="Arial" panose="020B0604020202020204" pitchFamily="34" charset="0"/>
+            </a:endParaRPr>
+          </a:p>
+          <a:p>
+            <a:pPr algn="just"/>
+            <a:endParaRPr lang="en-US" sz="2800" baseline="30000" dirty="0">
+              <a:solidFill>
+                <a:srgbClr val="000000"/>
+              </a:solidFill>
+              <a:latin typeface="Arial" panose="020B0604020202020204" pitchFamily="34" charset="0"/>
+            </a:endParaRPr>
+          </a:p>
+          <a:p>
+            <a:pPr algn="just"/>
+            <a:endParaRPr lang="en-US" sz="2800" baseline="30000" dirty="0">
+              <a:solidFill>
+                <a:srgbClr val="000000"/>
+              </a:solidFill>
+              <a:latin typeface="Arial" panose="020B0604020202020204" pitchFamily="34" charset="0"/>
+            </a:endParaRPr>
+          </a:p>
+          <a:p>
+            <a:pPr algn="just"/>
+            <a:endParaRPr lang="en-US" sz="2800" baseline="30000" dirty="0">
+              <a:solidFill>
+                <a:srgbClr val="000000"/>
+              </a:solidFill>
+              <a:latin typeface="Arial" panose="020B0604020202020204" pitchFamily="34" charset="0"/>
+            </a:endParaRPr>
+          </a:p>
+          <a:p>
+            <a:pPr algn="just"/>
+            <a:endParaRPr lang="en-US" sz="2800" baseline="30000" dirty="0">
+              <a:solidFill>
+                <a:srgbClr val="000000"/>
+              </a:solidFill>
+              <a:latin typeface="Arial" panose="020B0604020202020204" pitchFamily="34" charset="0"/>
+            </a:endParaRPr>
+          </a:p>
+          <a:p>
+            <a:pPr algn="just"/>
+            <a:endParaRPr lang="en-US" sz="2800" baseline="30000" dirty="0">
+              <a:solidFill>
+                <a:srgbClr val="000000"/>
+              </a:solidFill>
+              <a:latin typeface="Arial" panose="020B0604020202020204" pitchFamily="34" charset="0"/>
+            </a:endParaRPr>
+          </a:p>
+          <a:p>
+            <a:pPr algn="just"/>
+            <a:endParaRPr lang="en-US" sz="2800" baseline="30000" dirty="0">
+              <a:solidFill>
+                <a:srgbClr val="000000"/>
+              </a:solidFill>
+              <a:latin typeface="Arial" panose="020B0604020202020204" pitchFamily="34" charset="0"/>
+            </a:endParaRPr>
+          </a:p>
+          <a:p>
+            <a:pPr algn="just"/>
+            <a:endParaRPr lang="en-US" sz="2800" baseline="30000" dirty="0">
+              <a:solidFill>
+                <a:srgbClr val="000000"/>
+              </a:solidFill>
+              <a:latin typeface="Arial" panose="020B0604020202020204" pitchFamily="34" charset="0"/>
+            </a:endParaRPr>
+          </a:p>
+          <a:p>
+            <a:pPr algn="just"/>
+            <a:endParaRPr lang="en-US" sz="2800" baseline="30000" dirty="0">
+              <a:solidFill>
+                <a:srgbClr val="000000"/>
+              </a:solidFill>
+              <a:latin typeface="Arial" panose="020B0604020202020204" pitchFamily="34" charset="0"/>
+            </a:endParaRPr>
+          </a:p>
+          <a:p>
+            <a:pPr algn="just"/>
+            <a:endParaRPr lang="en-US" sz="2800" baseline="30000" dirty="0">
+              <a:solidFill>
+                <a:srgbClr val="000000"/>
+              </a:solidFill>
+              <a:latin typeface="Arial" panose="020B0604020202020204" pitchFamily="34" charset="0"/>
+            </a:endParaRPr>
+          </a:p>
+          <a:p>
+            <a:pPr algn="just"/>
+            <a:endParaRPr lang="en-US" sz="2800" baseline="30000" dirty="0">
+              <a:solidFill>
+                <a:srgbClr val="000000"/>
+              </a:solidFill>
+              <a:latin typeface="Arial" panose="020B0604020202020204" pitchFamily="34" charset="0"/>
+            </a:endParaRPr>
+          </a:p>
+          <a:p>
+            <a:pPr algn="just"/>
+            <a:endParaRPr lang="en-US" sz="2800" baseline="30000" dirty="0">
+              <a:solidFill>
+                <a:srgbClr val="000000"/>
+              </a:solidFill>
+              <a:latin typeface="Arial" panose="020B0604020202020204" pitchFamily="34" charset="0"/>
+            </a:endParaRPr>
+          </a:p>
+          <a:p>
+            <a:pPr algn="just"/>
+            <a:endParaRPr lang="en-US" sz="2800" baseline="30000" dirty="0">
+              <a:solidFill>
+                <a:srgbClr val="000000"/>
+              </a:solidFill>
+              <a:latin typeface="Arial" panose="020B0604020202020204" pitchFamily="34" charset="0"/>
+            </a:endParaRPr>
+          </a:p>
+          <a:p>
+            <a:pPr algn="just"/>
+            <a:endParaRPr lang="en-US" sz="2800" baseline="30000" dirty="0">
+              <a:solidFill>
+                <a:srgbClr val="000000"/>
+              </a:solidFill>
+              <a:latin typeface="Arial" panose="020B0604020202020204" pitchFamily="34" charset="0"/>
+            </a:endParaRPr>
+          </a:p>
+          <a:p>
+            <a:pPr algn="just"/>
+            <a:endParaRPr lang="en-US" sz="2800" baseline="30000" dirty="0">
+              <a:solidFill>
+                <a:srgbClr val="000000"/>
+              </a:solidFill>
+              <a:latin typeface="Arial" panose="020B0604020202020204" pitchFamily="34" charset="0"/>
+            </a:endParaRPr>
+          </a:p>
+          <a:p>
+            <a:pPr algn="just"/>
+            <a:endParaRPr lang="en-US" sz="2800" baseline="30000" dirty="0">
+              <a:solidFill>
+                <a:srgbClr val="000000"/>
+              </a:solidFill>
+              <a:latin typeface="Arial" panose="020B0604020202020204" pitchFamily="34" charset="0"/>
+            </a:endParaRPr>
+          </a:p>
+          <a:p>
+            <a:pPr algn="just"/>
+            <a:endParaRPr lang="en-US" sz="2800" baseline="30000" dirty="0">
+              <a:solidFill>
+                <a:srgbClr val="000000"/>
+              </a:solidFill>
+              <a:latin typeface="Arial" panose="020B0604020202020204" pitchFamily="34" charset="0"/>
+            </a:endParaRPr>
+          </a:p>
+          <a:p>
+            <a:pPr algn="just"/>
+            <a:endParaRPr lang="en-US" sz="2800" baseline="30000" dirty="0">
+              <a:solidFill>
+                <a:srgbClr val="000000"/>
+              </a:solidFill>
+              <a:latin typeface="Arial" panose="020B0604020202020204" pitchFamily="34" charset="0"/>
+            </a:endParaRPr>
+          </a:p>
+          <a:p>
+            <a:pPr algn="just"/>
+            <a:endParaRPr lang="en-US" sz="2800" baseline="-25000" dirty="0">
+              <a:solidFill>
+                <a:srgbClr val="000000"/>
+              </a:solidFill>
+              <a:latin typeface="Arial" panose="020B0604020202020204" pitchFamily="34" charset="0"/>
+            </a:endParaRPr>
+          </a:p>
+          <a:p>
+            <a:pPr algn="ctr"/>
+            <a:r>
+              <a:rPr lang="en-US" sz="2800" b="1" dirty="0">
+                <a:solidFill>
+                  <a:srgbClr val="000000"/>
+                </a:solidFill>
+              </a:rPr>
+              <a:t>Figure 1:</a:t>
+            </a:r>
+            <a:r>
+              <a:rPr lang="en-US" sz="2800" dirty="0">
+                <a:solidFill>
+                  <a:srgbClr val="000000"/>
+                </a:solidFill>
+              </a:rPr>
+              <a:t> Operations of </a:t>
+            </a:r>
+            <a:r>
+              <a:rPr lang="en-US" sz="2800" dirty="0"/>
+              <a:t>elements of </a:t>
+            </a:r>
+            <a:r>
+              <a:rPr lang="en-US" sz="2800" dirty="0">
                 <a:solidFill>
                   <a:srgbClr val="000000"/>
                 </a:solidFill>
@@ -6472,7 +6324,43 @@
               <a:t>x</a:t>
             </a:r>
             <a:r>
-              <a:rPr lang="en-US" sz="2800" baseline="30000" dirty="0" smtClean="0">
+              <a:rPr lang="en-US" sz="2800" baseline="30000" dirty="0">
+                <a:solidFill>
+                  <a:srgbClr val="000000"/>
+                </a:solidFill>
+                <a:latin typeface="Arial" panose="020B0604020202020204" pitchFamily="34" charset="0"/>
+              </a:rPr>
+              <a:t>3</a:t>
+            </a:r>
+            <a:r>
+              <a:rPr lang="en-US" sz="2800" dirty="0">
+                <a:solidFill>
+                  <a:srgbClr val="000000"/>
+                </a:solidFill>
+                <a:latin typeface="Arial" panose="020B0604020202020204" pitchFamily="34" charset="0"/>
+              </a:rPr>
+              <a:t> + x</a:t>
+            </a:r>
+            <a:r>
+              <a:rPr lang="en-US" sz="2800" baseline="30000" dirty="0">
+                <a:solidFill>
+                  <a:srgbClr val="000000"/>
+                </a:solidFill>
+                <a:latin typeface="Arial" panose="020B0604020202020204" pitchFamily="34" charset="0"/>
+              </a:rPr>
+              <a:t>2</a:t>
+            </a:r>
+            <a:r>
+              <a:rPr lang="en-US" sz="2800" dirty="0">
+                <a:solidFill>
+                  <a:srgbClr val="000000"/>
+                </a:solidFill>
+                <a:latin typeface="Arial" panose="020B0604020202020204" pitchFamily="34" charset="0"/>
+              </a:rPr>
+              <a:t> + x</a:t>
+            </a:r>
+            <a:r>
+              <a:rPr lang="en-US" sz="2800" baseline="30000" dirty="0">
                 <a:solidFill>
                   <a:srgbClr val="000000"/>
                 </a:solidFill>
@@ -6501,7 +6389,7 @@
           </a:p>
           <a:p>
             <a:pPr algn="ctr"/>
-            <a:endParaRPr lang="en-US" sz="2800" dirty="0" smtClean="0"/>
+            <a:endParaRPr lang="en-US" sz="2800" dirty="0"/>
           </a:p>
           <a:p>
             <a:pPr algn="ctr"/>
@@ -6530,7 +6418,7 @@
           <a:p>
             <a:pPr algn="ctr"/>
             <a:r>
-              <a:rPr lang="en-US" sz="3200" b="1" dirty="0" smtClean="0">
+              <a:rPr lang="en-US" sz="3200" b="1" dirty="0">
                 <a:solidFill>
                   <a:schemeClr val="bg1"/>
                 </a:solidFill>
@@ -6540,7 +6428,7 @@
           </a:p>
           <a:p>
             <a:pPr algn="just"/>
-            <a:endParaRPr lang="en-US" sz="2800" b="1" dirty="0" smtClean="0">
+            <a:endParaRPr lang="en-US" sz="2800" b="1" dirty="0">
               <a:solidFill>
                 <a:schemeClr val="bg1"/>
               </a:solidFill>
@@ -6550,7 +6438,7 @@
           <a:p>
             <a:pPr algn="just"/>
             <a:r>
-              <a:rPr lang="en-US" sz="2800" dirty="0" smtClean="0">
+              <a:rPr lang="en-US" sz="2800" dirty="0">
                 <a:solidFill>
                   <a:srgbClr val="000000"/>
                 </a:solidFill>
@@ -6561,7 +6449,7 @@
           </a:p>
           <a:p>
             <a:pPr algn="just"/>
-            <a:endParaRPr lang="en-US" sz="2800" dirty="0" smtClean="0">
+            <a:endParaRPr lang="en-US" sz="2800" dirty="0">
               <a:solidFill>
                 <a:srgbClr val="000000"/>
               </a:solidFill>
@@ -6571,7 +6459,7 @@
           <a:p>
             <a:pPr algn="ctr"/>
             <a:r>
-              <a:rPr lang="en-US" sz="3200" b="1" dirty="0" smtClean="0">
+              <a:rPr lang="en-US" sz="3200" b="1" dirty="0">
                 <a:solidFill>
                   <a:schemeClr val="bg1"/>
                 </a:solidFill>
@@ -6581,7 +6469,7 @@
           </a:p>
           <a:p>
             <a:pPr algn="ctr"/>
-            <a:endParaRPr lang="en-US" sz="2800" b="1" dirty="0" smtClean="0">
+            <a:endParaRPr lang="en-US" sz="2800" b="1" dirty="0">
               <a:solidFill>
                 <a:schemeClr val="bg1"/>
               </a:solidFill>
@@ -6594,7 +6482,7 @@
               <a:buChar char="§"/>
             </a:pPr>
             <a:r>
-              <a:rPr lang="en-US" sz="2800" dirty="0" smtClean="0">
+              <a:rPr lang="en-US" sz="2800" dirty="0">
                 <a:solidFill>
                   <a:srgbClr val="000000"/>
                 </a:solidFill>
@@ -6615,7 +6503,7 @@
               <a:buChar char="§"/>
             </a:pPr>
             <a:r>
-              <a:rPr lang="en-US" sz="2800" dirty="0" smtClean="0">
+              <a:rPr lang="en-US" sz="2800" dirty="0">
                 <a:solidFill>
                   <a:srgbClr val="000000"/>
                 </a:solidFill>
@@ -6636,22 +6524,13 @@
               <a:buChar char="§"/>
             </a:pPr>
             <a:r>
-              <a:rPr lang="en-US" sz="2800" dirty="0" smtClean="0">
-                <a:solidFill>
-                  <a:srgbClr val="000000"/>
-                </a:solidFill>
-                <a:latin typeface="Arial" panose="020B0604020202020204" pitchFamily="34" charset="0"/>
-              </a:rPr>
-              <a:t>Capability </a:t>
-            </a:r>
-            <a:r>
               <a:rPr lang="en-US" sz="2800" dirty="0">
                 <a:solidFill>
                   <a:srgbClr val="000000"/>
                 </a:solidFill>
                 <a:latin typeface="Arial" panose="020B0604020202020204" pitchFamily="34" charset="0"/>
               </a:rPr>
-              <a:t>of design limited only by external memory capacity</a:t>
+              <a:t>Capability of design limited only by external memory capacity</a:t>
             </a:r>
           </a:p>
           <a:p>
@@ -6675,16 +6554,7 @@
                 </a:solidFill>
                 <a:latin typeface="Arial" panose="020B0604020202020204" pitchFamily="34" charset="0"/>
               </a:rPr>
-              <a:t>&lt;BRIAN</a:t>
-            </a:r>
-            <a:r>
-              <a:rPr lang="en-US" sz="2800" b="1" dirty="0" smtClean="0">
-                <a:solidFill>
-                  <a:srgbClr val="000000"/>
-                </a:solidFill>
-                <a:latin typeface="Arial" panose="020B0604020202020204" pitchFamily="34" charset="0"/>
-              </a:rPr>
-              <a:t>&gt;</a:t>
+              <a:t>&lt;BRIAN&gt;</a:t>
             </a:r>
           </a:p>
           <a:p>
@@ -6707,15 +6577,7 @@
                   <a:schemeClr val="bg1"/>
                 </a:solidFill>
               </a:rPr>
-              <a:t>Prototype Design </a:t>
-            </a:r>
-            <a:r>
-              <a:rPr lang="en-US" sz="3200" b="1" dirty="0" smtClean="0">
-                <a:solidFill>
-                  <a:schemeClr val="bg1"/>
-                </a:solidFill>
-              </a:rPr>
-              <a:t>Specification</a:t>
+              <a:t>Prototype Design Specification</a:t>
             </a:r>
             <a:endParaRPr lang="en-US" sz="3200" b="1" dirty="0">
               <a:solidFill>
@@ -6761,16 +6623,7 @@
                 </a:solidFill>
                 <a:latin typeface="Arial" panose="020B0604020202020204" pitchFamily="34" charset="0"/>
               </a:rPr>
-              <a:t>Budget under $</a:t>
-            </a:r>
-            <a:r>
-              <a:rPr lang="en-US" sz="2800" dirty="0" smtClean="0">
-                <a:solidFill>
-                  <a:srgbClr val="000000"/>
-                </a:solidFill>
-                <a:latin typeface="Arial" panose="020B0604020202020204" pitchFamily="34" charset="0"/>
-              </a:rPr>
-              <a:t>400.</a:t>
+              <a:t>Budget under $400.</a:t>
             </a:r>
           </a:p>
           <a:p>
@@ -6785,31 +6638,13 @@
               <a:buChar char="§"/>
             </a:pPr>
             <a:r>
-              <a:rPr lang="en-US" sz="2800" dirty="0" smtClean="0">
-                <a:solidFill>
-                  <a:srgbClr val="000000"/>
-                </a:solidFill>
-                <a:latin typeface="Arial" panose="020B0604020202020204" pitchFamily="34" charset="0"/>
-              </a:rPr>
-              <a:t>Cost </a:t>
-            </a:r>
-            <a:r>
               <a:rPr lang="en-US" sz="2800" dirty="0">
                 <a:solidFill>
                   <a:srgbClr val="000000"/>
                 </a:solidFill>
                 <a:latin typeface="Arial" panose="020B0604020202020204" pitchFamily="34" charset="0"/>
               </a:rPr>
-              <a:t>of large scale production less than $1 per </a:t>
-            </a:r>
-            <a:r>
-              <a:rPr lang="en-US" sz="2800" dirty="0" smtClean="0">
-                <a:solidFill>
-                  <a:srgbClr val="000000"/>
-                </a:solidFill>
-                <a:latin typeface="Arial" panose="020B0604020202020204" pitchFamily="34" charset="0"/>
-              </a:rPr>
-              <a:t>chip</a:t>
+              <a:t>Cost of large scale production less than $1 per chip</a:t>
             </a:r>
           </a:p>
           <a:p>
@@ -6824,22 +6659,13 @@
               <a:buChar char="§"/>
             </a:pPr>
             <a:r>
-              <a:rPr lang="en-US" sz="2800" dirty="0" smtClean="0">
-                <a:solidFill>
-                  <a:srgbClr val="000000"/>
-                </a:solidFill>
-                <a:latin typeface="Arial" panose="020B0604020202020204" pitchFamily="34" charset="0"/>
-              </a:rPr>
-              <a:t>Area </a:t>
-            </a:r>
-            <a:r>
               <a:rPr lang="en-US" sz="2800" dirty="0">
                 <a:solidFill>
                   <a:srgbClr val="000000"/>
                 </a:solidFill>
                 <a:latin typeface="Arial" panose="020B0604020202020204" pitchFamily="34" charset="0"/>
               </a:rPr>
-              <a:t>of less than 24 in</a:t>
+              <a:t>Area of less than 24 in</a:t>
             </a:r>
             <a:r>
               <a:rPr lang="en-US" sz="2800" baseline="30000" dirty="0">
@@ -7021,7 +6847,7 @@
           <a:p>
             <a:pPr algn="ctr"/>
             <a:r>
-              <a:rPr lang="en-US" sz="3600" b="1" dirty="0" smtClean="0">
+              <a:rPr lang="en-US" sz="3600" b="1" dirty="0">
                 <a:solidFill>
                   <a:schemeClr val="bg1"/>
                 </a:solidFill>
@@ -7030,13 +6856,6 @@
               </a:rPr>
               <a:t>Results</a:t>
             </a:r>
-            <a:endParaRPr lang="en-US" sz="3600" b="1" dirty="0">
-              <a:solidFill>
-                <a:schemeClr val="bg1"/>
-              </a:solidFill>
-              <a:latin typeface="Ubuntu" panose="020B0504030602030204" pitchFamily="34" charset="0"/>
-              <a:cs typeface="Arial" panose="020B0604020202020204" pitchFamily="34" charset="0"/>
-            </a:endParaRPr>
           </a:p>
         </p:txBody>
       </p:sp>
@@ -7063,12 +6882,48 @@
             <a:tbl>
               <a:tblPr/>
               <a:tblGrid>
-                <a:gridCol w="1551709"/>
-                <a:gridCol w="1447800"/>
-                <a:gridCol w="1572491"/>
-                <a:gridCol w="1981200"/>
-                <a:gridCol w="1447800"/>
-                <a:gridCol w="1544903"/>
+                <a:gridCol w="1551709">
+                  <a:extLst>
+                    <a:ext uri="{9D8B030D-6E8A-4147-A177-3AD203B41FA5}">
+                      <a16:colId xmlns:a16="http://schemas.microsoft.com/office/drawing/2014/main" val="20000"/>
+                    </a:ext>
+                  </a:extLst>
+                </a:gridCol>
+                <a:gridCol w="1447800">
+                  <a:extLst>
+                    <a:ext uri="{9D8B030D-6E8A-4147-A177-3AD203B41FA5}">
+                      <a16:colId xmlns:a16="http://schemas.microsoft.com/office/drawing/2014/main" val="20001"/>
+                    </a:ext>
+                  </a:extLst>
+                </a:gridCol>
+                <a:gridCol w="1572491">
+                  <a:extLst>
+                    <a:ext uri="{9D8B030D-6E8A-4147-A177-3AD203B41FA5}">
+                      <a16:colId xmlns:a16="http://schemas.microsoft.com/office/drawing/2014/main" val="20002"/>
+                    </a:ext>
+                  </a:extLst>
+                </a:gridCol>
+                <a:gridCol w="1981200">
+                  <a:extLst>
+                    <a:ext uri="{9D8B030D-6E8A-4147-A177-3AD203B41FA5}">
+                      <a16:colId xmlns:a16="http://schemas.microsoft.com/office/drawing/2014/main" val="20003"/>
+                    </a:ext>
+                  </a:extLst>
+                </a:gridCol>
+                <a:gridCol w="1447800">
+                  <a:extLst>
+                    <a:ext uri="{9D8B030D-6E8A-4147-A177-3AD203B41FA5}">
+                      <a16:colId xmlns:a16="http://schemas.microsoft.com/office/drawing/2014/main" val="20004"/>
+                    </a:ext>
+                  </a:extLst>
+                </a:gridCol>
+                <a:gridCol w="1544903">
+                  <a:extLst>
+                    <a:ext uri="{9D8B030D-6E8A-4147-A177-3AD203B41FA5}">
+                      <a16:colId xmlns:a16="http://schemas.microsoft.com/office/drawing/2014/main" val="20005"/>
+                    </a:ext>
+                  </a:extLst>
+                </a:gridCol>
               </a:tblGrid>
               <a:tr h="653454">
                 <a:tc>
@@ -7557,6 +7412,11 @@
                     </a:solidFill>
                   </a:tcPr>
                 </a:tc>
+                <a:extLst>
+                  <a:ext uri="{0D108BD9-81ED-4DB2-BD59-A6C34878D82A}">
+                    <a16:rowId xmlns:a16="http://schemas.microsoft.com/office/drawing/2014/main" val="10000"/>
+                  </a:ext>
+                </a:extLst>
               </a:tr>
               <a:tr h="621520">
                 <a:tc>
@@ -7573,7 +7433,7 @@
                         </a:spcAft>
                       </a:pPr>
                       <a:r>
-                        <a:rPr lang="en-US" sz="2800" b="0" i="0" u="none" strike="noStrike" dirty="0" smtClean="0">
+                        <a:rPr lang="en-US" sz="2800" b="0" i="0" u="none" strike="noStrike" dirty="0">
                           <a:solidFill>
                             <a:srgbClr val="000000"/>
                           </a:solidFill>
@@ -8027,6 +7887,11 @@
                     </a:lnBlToTr>
                   </a:tcPr>
                 </a:tc>
+                <a:extLst>
+                  <a:ext uri="{0D108BD9-81ED-4DB2-BD59-A6C34878D82A}">
+                    <a16:rowId xmlns:a16="http://schemas.microsoft.com/office/drawing/2014/main" val="10001"/>
+                  </a:ext>
+                </a:extLst>
               </a:tr>
               <a:tr h="621520">
                 <a:tc>
@@ -8519,6 +8384,11 @@
                     </a:lnBlToTr>
                   </a:tcPr>
                 </a:tc>
+                <a:extLst>
+                  <a:ext uri="{0D108BD9-81ED-4DB2-BD59-A6C34878D82A}">
+                    <a16:rowId xmlns:a16="http://schemas.microsoft.com/office/drawing/2014/main" val="10002"/>
+                  </a:ext>
+                </a:extLst>
               </a:tr>
               <a:tr h="621520">
                 <a:tc>
@@ -9022,6 +8892,11 @@
                     </a:lnBlToTr>
                   </a:tcPr>
                 </a:tc>
+                <a:extLst>
+                  <a:ext uri="{0D108BD9-81ED-4DB2-BD59-A6C34878D82A}">
+                    <a16:rowId xmlns:a16="http://schemas.microsoft.com/office/drawing/2014/main" val="10003"/>
+                  </a:ext>
+                </a:extLst>
               </a:tr>
               <a:tr h="621520">
                 <a:tc>
@@ -9525,6 +9400,11 @@
                     </a:lnBlToTr>
                   </a:tcPr>
                 </a:tc>
+                <a:extLst>
+                  <a:ext uri="{0D108BD9-81ED-4DB2-BD59-A6C34878D82A}">
+                    <a16:rowId xmlns:a16="http://schemas.microsoft.com/office/drawing/2014/main" val="10004"/>
+                  </a:ext>
+                </a:extLst>
               </a:tr>
               <a:tr h="621520">
                 <a:tc>
@@ -10039,6 +9919,11 @@
                     </a:lnBlToTr>
                   </a:tcPr>
                 </a:tc>
+                <a:extLst>
+                  <a:ext uri="{0D108BD9-81ED-4DB2-BD59-A6C34878D82A}">
+                    <a16:rowId xmlns:a16="http://schemas.microsoft.com/office/drawing/2014/main" val="10005"/>
+                  </a:ext>
+                </a:extLst>
               </a:tr>
               <a:tr h="626290">
                 <a:tc>
@@ -10575,6 +10460,11 @@
                     </a:lnBlToTr>
                   </a:tcPr>
                 </a:tc>
+                <a:extLst>
+                  <a:ext uri="{0D108BD9-81ED-4DB2-BD59-A6C34878D82A}">
+                    <a16:rowId xmlns:a16="http://schemas.microsoft.com/office/drawing/2014/main" val="10006"/>
+                  </a:ext>
+                </a:extLst>
               </a:tr>
               <a:tr h="621520">
                 <a:tc>
@@ -11089,6 +10979,11 @@
                     </a:lnBlToTr>
                   </a:tcPr>
                 </a:tc>
+                <a:extLst>
+                  <a:ext uri="{0D108BD9-81ED-4DB2-BD59-A6C34878D82A}">
+                    <a16:rowId xmlns:a16="http://schemas.microsoft.com/office/drawing/2014/main" val="10007"/>
+                  </a:ext>
+                </a:extLst>
               </a:tr>
               <a:tr h="621520">
                 <a:tc>
@@ -11614,6 +11509,11 @@
                     </a:lnBlToTr>
                   </a:tcPr>
                 </a:tc>
+                <a:extLst>
+                  <a:ext uri="{0D108BD9-81ED-4DB2-BD59-A6C34878D82A}">
+                    <a16:rowId xmlns:a16="http://schemas.microsoft.com/office/drawing/2014/main" val="10008"/>
+                  </a:ext>
+                </a:extLst>
               </a:tr>
             </a:tbl>
           </a:graphicData>
@@ -11660,7 +11560,7 @@
           <a:p>
             <a:pPr algn="ctr"/>
             <a:r>
-              <a:rPr lang="en-US" sz="3600" b="1" dirty="0" smtClean="0">
+              <a:rPr lang="en-US" sz="3600" b="1" dirty="0">
                 <a:solidFill>
                   <a:schemeClr val="bg1"/>
                 </a:solidFill>
@@ -11686,7 +11586,7 @@
         </p:nvSpPr>
         <p:spPr>
           <a:xfrm>
-            <a:off x="13130769" y="4391204"/>
+            <a:off x="13159536" y="4267200"/>
             <a:ext cx="10407230" cy="23421796"/>
           </a:xfrm>
           <a:prstGeom prst="rect">
@@ -11707,14 +11607,6 @@
             </a:endParaRPr>
           </a:p>
           <a:p>
-            <a:endParaRPr lang="en-US" sz="2800" dirty="0" smtClean="0">
-              <a:solidFill>
-                <a:srgbClr val="000000"/>
-              </a:solidFill>
-              <a:latin typeface="+mn-lt"/>
-            </a:endParaRPr>
-          </a:p>
-          <a:p>
             <a:endParaRPr lang="en-US" sz="2800" dirty="0">
               <a:solidFill>
                 <a:srgbClr val="000000"/>
@@ -11723,14 +11615,6 @@
             </a:endParaRPr>
           </a:p>
           <a:p>
-            <a:endParaRPr lang="en-US" sz="2800" dirty="0" smtClean="0">
-              <a:solidFill>
-                <a:srgbClr val="000000"/>
-              </a:solidFill>
-              <a:latin typeface="+mn-lt"/>
-            </a:endParaRPr>
-          </a:p>
-          <a:p>
             <a:endParaRPr lang="en-US" sz="2800" dirty="0">
               <a:solidFill>
                 <a:srgbClr val="000000"/>
@@ -11739,14 +11623,6 @@
             </a:endParaRPr>
           </a:p>
           <a:p>
-            <a:endParaRPr lang="en-US" sz="2800" dirty="0" smtClean="0">
-              <a:solidFill>
-                <a:srgbClr val="000000"/>
-              </a:solidFill>
-              <a:latin typeface="+mn-lt"/>
-            </a:endParaRPr>
-          </a:p>
-          <a:p>
             <a:endParaRPr lang="en-US" sz="2800" dirty="0">
               <a:solidFill>
                 <a:srgbClr val="000000"/>
@@ -11755,14 +11631,6 @@
             </a:endParaRPr>
           </a:p>
           <a:p>
-            <a:endParaRPr lang="en-US" sz="2800" dirty="0" smtClean="0">
-              <a:solidFill>
-                <a:srgbClr val="000000"/>
-              </a:solidFill>
-              <a:latin typeface="+mn-lt"/>
-            </a:endParaRPr>
-          </a:p>
-          <a:p>
             <a:endParaRPr lang="en-US" sz="2800" dirty="0">
               <a:solidFill>
                 <a:srgbClr val="000000"/>
@@ -11779,34 +11647,52 @@
             </a:endParaRPr>
           </a:p>
           <a:p>
+            <a:endParaRPr lang="en-US" sz="2800" dirty="0">
+              <a:solidFill>
+                <a:srgbClr val="000000"/>
+              </a:solidFill>
+              <a:latin typeface="+mn-lt"/>
+            </a:endParaRPr>
+          </a:p>
+          <a:p>
+            <a:endParaRPr lang="en-US" sz="2800" dirty="0">
+              <a:solidFill>
+                <a:srgbClr val="000000"/>
+              </a:solidFill>
+              <a:latin typeface="+mn-lt"/>
+            </a:endParaRPr>
+          </a:p>
+          <a:p>
+            <a:endParaRPr lang="en-US" sz="2800" dirty="0">
+              <a:solidFill>
+                <a:srgbClr val="000000"/>
+              </a:solidFill>
+              <a:latin typeface="+mn-lt"/>
+            </a:endParaRPr>
+          </a:p>
+          <a:p>
+            <a:endParaRPr lang="en-US" sz="2800" dirty="0">
+              <a:solidFill>
+                <a:srgbClr val="000000"/>
+              </a:solidFill>
+              <a:latin typeface="+mn-lt"/>
+            </a:endParaRPr>
+          </a:p>
+          <a:p>
             <a:pPr algn="ctr"/>
             <a:r>
               <a:rPr lang="en-US" sz="2800" b="1" dirty="0">
                 <a:latin typeface="Arial" panose="020B0604020202020204" pitchFamily="34" charset="0"/>
                 <a:cs typeface="Arial" panose="020B0604020202020204" pitchFamily="34" charset="0"/>
               </a:rPr>
-              <a:t>Figure </a:t>
-            </a:r>
-            <a:r>
-              <a:rPr lang="en-US" sz="2800" b="1" dirty="0" smtClean="0">
-                <a:latin typeface="Arial" panose="020B0604020202020204" pitchFamily="34" charset="0"/>
-                <a:cs typeface="Arial" panose="020B0604020202020204" pitchFamily="34" charset="0"/>
-              </a:rPr>
-              <a:t>3: </a:t>
+              <a:t>Figure 3: </a:t>
             </a:r>
             <a:r>
               <a:rPr lang="en-US" sz="2800" dirty="0">
                 <a:latin typeface="Arial" panose="020B0604020202020204" pitchFamily="34" charset="0"/>
                 <a:cs typeface="Arial" panose="020B0604020202020204" pitchFamily="34" charset="0"/>
               </a:rPr>
-              <a:t>Functional Flow </a:t>
-            </a:r>
-            <a:r>
-              <a:rPr lang="en-US" sz="2800" dirty="0" smtClean="0">
-                <a:latin typeface="Arial" panose="020B0604020202020204" pitchFamily="34" charset="0"/>
-                <a:cs typeface="Arial" panose="020B0604020202020204" pitchFamily="34" charset="0"/>
-              </a:rPr>
-              <a:t>Diagram</a:t>
+              <a:t>Functional Flow Diagram</a:t>
             </a:r>
           </a:p>
           <a:p>
@@ -11818,7 +11704,7 @@
           </a:p>
           <a:p>
             <a:pPr algn="ctr"/>
-            <a:endParaRPr lang="en-US" sz="2800" dirty="0" smtClean="0">
+            <a:endParaRPr lang="en-US" sz="2800" dirty="0">
               <a:latin typeface="Arial" panose="020B0604020202020204" pitchFamily="34" charset="0"/>
               <a:cs typeface="Arial" panose="020B0604020202020204" pitchFamily="34" charset="0"/>
             </a:endParaRPr>
@@ -11832,7 +11718,7 @@
           </a:p>
           <a:p>
             <a:pPr algn="ctr"/>
-            <a:endParaRPr lang="en-US" sz="2800" dirty="0" smtClean="0">
+            <a:endParaRPr lang="en-US" sz="2800" dirty="0">
               <a:latin typeface="Arial" panose="020B0604020202020204" pitchFamily="34" charset="0"/>
               <a:cs typeface="Arial" panose="020B0604020202020204" pitchFamily="34" charset="0"/>
             </a:endParaRPr>
@@ -11846,7 +11732,7 @@
           </a:p>
           <a:p>
             <a:pPr algn="ctr"/>
-            <a:endParaRPr lang="en-US" sz="2800" dirty="0" smtClean="0">
+            <a:endParaRPr lang="en-US" sz="2800" dirty="0">
               <a:latin typeface="Arial" panose="020B0604020202020204" pitchFamily="34" charset="0"/>
               <a:cs typeface="Arial" panose="020B0604020202020204" pitchFamily="34" charset="0"/>
             </a:endParaRPr>
@@ -11860,7 +11746,7 @@
           </a:p>
           <a:p>
             <a:pPr algn="ctr"/>
-            <a:endParaRPr lang="en-US" sz="2800" dirty="0" smtClean="0">
+            <a:endParaRPr lang="en-US" sz="2800" dirty="0">
               <a:latin typeface="Arial" panose="020B0604020202020204" pitchFamily="34" charset="0"/>
               <a:cs typeface="Arial" panose="020B0604020202020204" pitchFamily="34" charset="0"/>
             </a:endParaRPr>
@@ -11874,7 +11760,7 @@
           </a:p>
           <a:p>
             <a:pPr algn="ctr"/>
-            <a:endParaRPr lang="en-US" sz="2800" dirty="0" smtClean="0">
+            <a:endParaRPr lang="en-US" sz="2800" dirty="0">
               <a:latin typeface="Arial" panose="020B0604020202020204" pitchFamily="34" charset="0"/>
               <a:cs typeface="Arial" panose="020B0604020202020204" pitchFamily="34" charset="0"/>
             </a:endParaRPr>
@@ -11888,7 +11774,7 @@
           </a:p>
           <a:p>
             <a:pPr algn="ctr"/>
-            <a:endParaRPr lang="en-US" sz="2800" dirty="0" smtClean="0">
+            <a:endParaRPr lang="en-US" sz="2800" dirty="0">
               <a:latin typeface="Arial" panose="020B0604020202020204" pitchFamily="34" charset="0"/>
               <a:cs typeface="Arial" panose="020B0604020202020204" pitchFamily="34" charset="0"/>
             </a:endParaRPr>
@@ -11902,7 +11788,7 @@
           </a:p>
           <a:p>
             <a:pPr algn="ctr"/>
-            <a:endParaRPr lang="en-US" sz="2800" dirty="0" smtClean="0">
+            <a:endParaRPr lang="en-US" sz="2800" dirty="0">
               <a:latin typeface="Arial" panose="020B0604020202020204" pitchFamily="34" charset="0"/>
               <a:cs typeface="Arial" panose="020B0604020202020204" pitchFamily="34" charset="0"/>
             </a:endParaRPr>
@@ -11923,7 +11809,7 @@
           </a:p>
           <a:p>
             <a:pPr algn="ctr"/>
-            <a:endParaRPr lang="en-US" sz="2800" dirty="0" smtClean="0">
+            <a:endParaRPr lang="en-US" sz="2800" dirty="0">
               <a:latin typeface="Arial" panose="020B0604020202020204" pitchFamily="34" charset="0"/>
               <a:cs typeface="Arial" panose="020B0604020202020204" pitchFamily="34" charset="0"/>
             </a:endParaRPr>
@@ -11937,25 +11823,7 @@
                 </a:solidFill>
                 <a:latin typeface="Arial" panose="020B0604020202020204" pitchFamily="34" charset="0"/>
               </a:rPr>
-              <a:t> Figure </a:t>
-            </a:r>
-            <a:r>
-              <a:rPr lang="en-US" sz="2800" b="1" dirty="0" smtClean="0">
-                <a:solidFill>
-                  <a:srgbClr val="000000"/>
-                </a:solidFill>
-                <a:latin typeface="Arial" panose="020B0604020202020204" pitchFamily="34" charset="0"/>
-              </a:rPr>
-              <a:t>4: </a:t>
-            </a:r>
-            <a:r>
-              <a:rPr lang="en-US" sz="2800" dirty="0" smtClean="0">
-                <a:solidFill>
-                  <a:srgbClr val="000000"/>
-                </a:solidFill>
-                <a:latin typeface="Arial" panose="020B0604020202020204" pitchFamily="34" charset="0"/>
-              </a:rPr>
-              <a:t>High Level </a:t>
+              <a:t> Figure 4: </a:t>
             </a:r>
             <a:r>
               <a:rPr lang="en-US" sz="2800" dirty="0">
@@ -11964,17 +11832,11 @@
                 </a:solidFill>
                 <a:latin typeface="Arial" panose="020B0604020202020204" pitchFamily="34" charset="0"/>
               </a:rPr>
-              <a:t>Block </a:t>
+              <a:t>High Level Block Schematic</a:t>
             </a:r>
-            <a:r>
-              <a:rPr lang="en-US" sz="2800" dirty="0" smtClean="0">
-                <a:solidFill>
-                  <a:srgbClr val="000000"/>
-                </a:solidFill>
-                <a:latin typeface="Arial" panose="020B0604020202020204" pitchFamily="34" charset="0"/>
-              </a:rPr>
-              <a:t>Schematic</a:t>
-            </a:r>
+          </a:p>
+          <a:p>
+            <a:pPr algn="ctr"/>
             <a:endParaRPr lang="en-US" sz="2800" dirty="0">
               <a:solidFill>
                 <a:srgbClr val="000000"/>
@@ -11984,17 +11846,8 @@
           </a:p>
           <a:p>
             <a:pPr algn="ctr"/>
-            <a:endParaRPr lang="en-US" sz="2800" dirty="0" smtClean="0">
-              <a:solidFill>
-                <a:srgbClr val="000000"/>
-              </a:solidFill>
-              <a:latin typeface="Arial" panose="020B0604020202020204" pitchFamily="34" charset="0"/>
-            </a:endParaRPr>
-          </a:p>
-          <a:p>
-            <a:pPr algn="ctr"/>
             <a:r>
-              <a:rPr lang="en-US" sz="3200" b="1" dirty="0" smtClean="0">
+              <a:rPr lang="en-US" sz="3200" b="1" dirty="0">
                 <a:solidFill>
                   <a:srgbClr val="006435"/>
                 </a:solidFill>
@@ -12237,16 +12090,7 @@
                 </a:solidFill>
                 <a:latin typeface="Arial" panose="020B0604020202020204" pitchFamily="34" charset="0"/>
               </a:rPr>
-              <a:t>Determines operations requested through </a:t>
-            </a:r>
-            <a:r>
-              <a:rPr lang="en-US" sz="2800" dirty="0" smtClean="0">
-                <a:solidFill>
-                  <a:srgbClr val="000000"/>
-                </a:solidFill>
-                <a:latin typeface="Arial" panose="020B0604020202020204" pitchFamily="34" charset="0"/>
-              </a:rPr>
-              <a:t>6-bit opcode</a:t>
+              <a:t>Determines operations requested through 6-bit opcode</a:t>
             </a:r>
           </a:p>
           <a:p>
@@ -12321,20 +12165,14 @@
               <a:buChar char="§"/>
             </a:pPr>
             <a:r>
-              <a:rPr lang="en-US" sz="2800" dirty="0" err="1">
+              <a:rPr lang="en-US" sz="2800" dirty="0">
                 <a:solidFill>
                   <a:srgbClr val="000000"/>
                 </a:solidFill>
                 <a:latin typeface="Arial" panose="020B0604020202020204" pitchFamily="34" charset="0"/>
               </a:rPr>
-              <a:t>Afsdfs</a:t>
+              <a:t>Handles all communication between GFAU and external device</a:t>
             </a:r>
-            <a:endParaRPr lang="en-US" sz="2800" dirty="0">
-              <a:solidFill>
-                <a:srgbClr val="000000"/>
-              </a:solidFill>
-              <a:latin typeface="Arial" panose="020B0604020202020204" pitchFamily="34" charset="0"/>
-            </a:endParaRPr>
           </a:p>
           <a:p>
             <a:pPr marL="914400" lvl="1" indent="-457200">
@@ -12348,40 +12186,22 @@
               <a:buChar char="§"/>
             </a:pPr>
             <a:r>
-              <a:rPr lang="en-US" sz="2800" dirty="0" err="1" smtClean="0">
+              <a:rPr lang="en-US" sz="2800" dirty="0" err="1">
                 <a:solidFill>
                   <a:srgbClr val="000000"/>
                 </a:solidFill>
                 <a:latin typeface="Arial" panose="020B0604020202020204" pitchFamily="34" charset="0"/>
               </a:rPr>
-              <a:t>Asffds</a:t>
+              <a:t>Asychronous</a:t>
             </a:r>
-            <a:endParaRPr lang="en-US" sz="2800" dirty="0" smtClean="0">
-              <a:solidFill>
-                <a:srgbClr val="000000"/>
-              </a:solidFill>
-              <a:latin typeface="Arial" panose="020B0604020202020204" pitchFamily="34" charset="0"/>
-            </a:endParaRPr>
-          </a:p>
-          <a:p>
-            <a:pPr marL="914400" lvl="1" indent="-457200">
-              <a:spcBef>
-                <a:spcPts val="0"/>
-              </a:spcBef>
-              <a:spcAft>
-                <a:spcPts val="0"/>
-              </a:spcAft>
-              <a:buFont typeface="Wingdings" panose="05000000000000000000" pitchFamily="2" charset="2"/>
-              <a:buChar char="§"/>
-            </a:pPr>
             <a:r>
-              <a:rPr lang="en-US" sz="2800" dirty="0" smtClean="0">
+              <a:rPr lang="en-US" sz="2800" dirty="0">
                 <a:solidFill>
                   <a:srgbClr val="000000"/>
                 </a:solidFill>
                 <a:latin typeface="Arial" panose="020B0604020202020204" pitchFamily="34" charset="0"/>
               </a:rPr>
-              <a:t>f</a:t>
+              <a:t> parallel protocol and scalable IO bus make communication fast and flexible</a:t>
             </a:r>
           </a:p>
           <a:p>
@@ -12423,23 +12243,8 @@
                 </a:solidFill>
                 <a:latin typeface="Arial" panose="020B0604020202020204" pitchFamily="34" charset="0"/>
               </a:rPr>
-              <a:t>Handle memory read and write requests from the generator, operators and control </a:t>
+              <a:t>Handle memory read and write requests from the generator, operators and control unit</a:t>
             </a:r>
-            <a:r>
-              <a:rPr lang="en-US" sz="2800" dirty="0" smtClean="0">
-                <a:solidFill>
-                  <a:srgbClr val="000000"/>
-                </a:solidFill>
-                <a:latin typeface="Arial" panose="020B0604020202020204" pitchFamily="34" charset="0"/>
-              </a:rPr>
-              <a:t>unit</a:t>
-            </a:r>
-            <a:endParaRPr lang="en-US" sz="2800" dirty="0">
-              <a:solidFill>
-                <a:srgbClr val="000000"/>
-              </a:solidFill>
-              <a:latin typeface="Arial" panose="020B0604020202020204" pitchFamily="34" charset="0"/>
-            </a:endParaRPr>
           </a:p>
         </p:txBody>
       </p:sp>
@@ -12507,7 +12312,7 @@
         </p:blipFill>
         <p:spPr bwMode="auto">
           <a:xfrm>
-            <a:off x="20116801" y="24074384"/>
+            <a:off x="24843698" y="23741757"/>
             <a:ext cx="3396030" cy="1817517"/>
           </a:xfrm>
           <a:prstGeom prst="rect">
@@ -12566,7 +12371,7 @@
           <a:p>
             <a:pPr algn="ctr"/>
             <a:r>
-              <a:rPr lang="en-US" sz="3600" b="1" dirty="0" smtClean="0">
+              <a:rPr lang="en-US" sz="3600" b="1" dirty="0">
                 <a:solidFill>
                   <a:schemeClr val="bg1"/>
                 </a:solidFill>
@@ -12575,13 +12380,6 @@
               </a:rPr>
               <a:t>Conclusion</a:t>
             </a:r>
-            <a:endParaRPr lang="en-US" sz="3600" b="1" dirty="0">
-              <a:solidFill>
-                <a:schemeClr val="bg1"/>
-              </a:solidFill>
-              <a:latin typeface="Ubuntu" panose="020B0504030602030204" pitchFamily="34" charset="0"/>
-              <a:cs typeface="Arial" panose="020B0604020202020204" pitchFamily="34" charset="0"/>
-            </a:endParaRPr>
           </a:p>
         </p:txBody>
       </p:sp>
@@ -12644,15 +12442,7 @@
               <a:srgbClr val="FFFFFF"/>
             </a:contourClr>
           </a:sp3d>
-          <a:extLst>
-            <a:ext uri="{909E8E84-426E-40DD-AFC4-6F175D3DCCD1}">
-              <a14:hiddenFill xmlns:a14="http://schemas.microsoft.com/office/drawing/2010/main">
-                <a:solidFill>
-                  <a:srgbClr val="FFFFFF"/>
-                </a:solidFill>
-              </a14:hiddenFill>
-            </a:ext>
-          </a:extLst>
+          <a:extLst/>
         </p:spPr>
       </p:pic>
       <p:pic>
@@ -12737,19 +12527,9 @@
                 <a:latin typeface="+mn-lt"/>
                 <a:cs typeface="Times New Roman" panose="02020603050405020304" pitchFamily="18" charset="0"/>
               </a:rPr>
-              <a:t>Galois Field Arithmetic Unit (GFAU</a:t>
+              <a:t>Galois Field Arithmetic Unit (GFAU)</a:t>
             </a:r>
-            <a:r>
-              <a:rPr lang="en-US" sz="4800" b="1" dirty="0" smtClean="0">
-                <a:solidFill>
-                  <a:schemeClr val="bg1"/>
-                </a:solidFill>
-                <a:latin typeface="+mn-lt"/>
-                <a:cs typeface="Times New Roman" panose="02020603050405020304" pitchFamily="18" charset="0"/>
-              </a:rPr>
-              <a:t>)</a:t>
-            </a:r>
-            <a:endParaRPr lang="en-US" sz="1000" b="1" dirty="0" smtClean="0">
+            <a:endParaRPr lang="en-US" sz="1000" b="1" dirty="0">
               <a:solidFill>
                 <a:schemeClr val="bg1"/>
               </a:solidFill>
@@ -12767,19 +12547,9 @@
                 <a:latin typeface="+mn-lt"/>
                 <a:cs typeface="Times New Roman" panose="02020603050405020304" pitchFamily="18" charset="0"/>
               </a:rPr>
-              <a:t> </a:t>
+              <a:t>   </a:t>
             </a:r>
-            <a:r>
-              <a:rPr lang="en-US" sz="1000" b="1" dirty="0" smtClean="0">
-                <a:solidFill>
-                  <a:schemeClr val="bg1"/>
-                </a:solidFill>
-                <a:latin typeface="+mn-lt"/>
-                <a:cs typeface="Times New Roman" panose="02020603050405020304" pitchFamily="18" charset="0"/>
-              </a:rPr>
-              <a:t>  </a:t>
-            </a:r>
-            <a:endParaRPr lang="en-US" sz="4600" dirty="0" smtClean="0">
+            <a:endParaRPr lang="en-US" sz="4600" dirty="0">
               <a:solidFill>
                 <a:schemeClr val="bg1"/>
               </a:solidFill>
@@ -12790,7 +12560,7 @@
           <a:p>
             <a:pPr algn="ctr"/>
             <a:r>
-              <a:rPr lang="en-US" sz="4600" dirty="0" err="1" smtClean="0">
+              <a:rPr lang="en-US" sz="4600" dirty="0" err="1">
                 <a:solidFill>
                   <a:schemeClr val="bg1"/>
                 </a:solidFill>
@@ -12800,16 +12570,6 @@
               <a:t>Sabbir</a:t>
             </a:r>
             <a:r>
-              <a:rPr lang="en-US" sz="4600" dirty="0" smtClean="0">
-                <a:solidFill>
-                  <a:schemeClr val="bg1"/>
-                </a:solidFill>
-                <a:latin typeface="+mn-lt"/>
-                <a:cs typeface="Times New Roman" panose="02020603050405020304" pitchFamily="18" charset="0"/>
-              </a:rPr>
-              <a:t> </a:t>
-            </a:r>
-            <a:r>
               <a:rPr lang="en-US" sz="4600" dirty="0">
                 <a:solidFill>
                   <a:schemeClr val="bg1"/>
@@ -12817,7 +12577,7 @@
                 <a:latin typeface="+mn-lt"/>
                 <a:cs typeface="Times New Roman" panose="02020603050405020304" pitchFamily="18" charset="0"/>
               </a:rPr>
-              <a:t>Ahmed, Jeffrey </a:t>
+              <a:t> Ahmed, Jeffrey </a:t>
             </a:r>
             <a:r>
               <a:rPr lang="en-US" sz="4600" dirty="0" err="1">
@@ -12867,45 +12627,8 @@
                 <a:latin typeface="+mj-lt"/>
                 <a:cs typeface="Times New Roman" panose="02020603050405020304" pitchFamily="18" charset="0"/>
               </a:rPr>
-              <a:t>Department of Computer Science and Electrical Engineering, </a:t>
+              <a:t>Department of Computer Science and Electrical Engineering, University of Maryland, Baltimore County</a:t>
             </a:r>
-            <a:r>
-              <a:rPr lang="en-US" sz="4200" dirty="0" smtClean="0">
-                <a:solidFill>
-                  <a:schemeClr val="bg1"/>
-                </a:solidFill>
-                <a:latin typeface="+mj-lt"/>
-                <a:cs typeface="Times New Roman" panose="02020603050405020304" pitchFamily="18" charset="0"/>
-              </a:rPr>
-              <a:t>University </a:t>
-            </a:r>
-            <a:r>
-              <a:rPr lang="en-US" sz="4200" dirty="0">
-                <a:solidFill>
-                  <a:schemeClr val="bg1"/>
-                </a:solidFill>
-                <a:latin typeface="+mj-lt"/>
-                <a:cs typeface="Times New Roman" panose="02020603050405020304" pitchFamily="18" charset="0"/>
-              </a:rPr>
-              <a:t>of Maryland, Baltimore </a:t>
-            </a:r>
-            <a:r>
-              <a:rPr lang="en-US" sz="4200" dirty="0" smtClean="0">
-                <a:solidFill>
-                  <a:schemeClr val="bg1"/>
-                </a:solidFill>
-                <a:latin typeface="+mj-lt"/>
-                <a:cs typeface="Times New Roman" panose="02020603050405020304" pitchFamily="18" charset="0"/>
-              </a:rPr>
-              <a:t>County</a:t>
-            </a:r>
-            <a:endParaRPr lang="en-US" sz="4200" dirty="0">
-              <a:solidFill>
-                <a:schemeClr val="bg1"/>
-              </a:solidFill>
-              <a:latin typeface="+mj-lt"/>
-              <a:cs typeface="Times New Roman" panose="02020603050405020304" pitchFamily="18" charset="0"/>
-            </a:endParaRPr>
           </a:p>
         </p:txBody>
       </p:sp>
@@ -12973,7 +12696,7 @@
                 <a:buNone/>
                 <a:tabLst/>
               </a:pPr>
-              <a:endParaRPr kumimoji="0" lang="en-US" sz="7500" b="0" i="0" u="none" strike="noStrike" cap="none" normalizeH="0" baseline="0" smtClean="0">
+              <a:endParaRPr kumimoji="0" lang="en-US" sz="7500" b="0" i="0" u="none" strike="noStrike" cap="none" normalizeH="0" baseline="0">
                 <a:ln>
                   <a:noFill/>
                 </a:ln>
@@ -13279,13 +13002,6 @@
   <p:clrMapOvr>
     <a:masterClrMapping/>
   </p:clrMapOvr>
-  <p:timing>
-    <p:tnLst>
-      <p:par>
-        <p:cTn id="1" dur="indefinite" restart="never" nodeType="tmRoot"/>
-      </p:par>
-    </p:tnLst>
-  </p:timing>
 </p:sld>
 </file>
 

</xml_diff>